<commit_message>
Add note on APIs and JSON
</commit_message>
<xml_diff>
--- a/session_seven/session_seven_presentation.pptx
+++ b/session_seven/session_seven_presentation.pptx
@@ -8,10 +8,10 @@
     <p:sldMasterId id="2147483656" r:id="rId8"/>
   </p:sldMasterIdLst>
   <p:notesMasterIdLst>
-    <p:notesMasterId r:id="rId23"/>
+    <p:notesMasterId r:id="rId24"/>
   </p:notesMasterIdLst>
   <p:handoutMasterIdLst>
-    <p:handoutMasterId r:id="rId24"/>
+    <p:handoutMasterId r:id="rId25"/>
   </p:handoutMasterIdLst>
   <p:sldIdLst>
     <p:sldId id="386" r:id="rId9"/>
@@ -28,11 +28,12 @@
     <p:sldId id="472" r:id="rId20"/>
     <p:sldId id="473" r:id="rId21"/>
     <p:sldId id="474" r:id="rId22"/>
+    <p:sldId id="475" r:id="rId23"/>
   </p:sldIdLst>
   <p:sldSz cx="9144000" cy="5143500" type="screen16x9"/>
   <p:notesSz cx="6670675" cy="9875838"/>
   <p:custDataLst>
-    <p:tags r:id="rId25"/>
+    <p:tags r:id="rId26"/>
   </p:custDataLst>
   <p:defaultTextStyle>
     <a:defPPr>
@@ -1480,6 +1481,91 @@
 </p:notes>
 </file>
 
+<file path=ppt/notesSlides/notesSlide10.xml><?xml version="1.0" encoding="utf-8"?>
+<p:notes xmlns:a="http://schemas.openxmlformats.org/drawingml/2006/main" xmlns:r="http://schemas.openxmlformats.org/officeDocument/2006/relationships" xmlns:p="http://schemas.openxmlformats.org/presentationml/2006/main">
+  <p:cSld>
+    <p:spTree>
+      <p:nvGrpSpPr>
+        <p:cNvPr id="1" name=""/>
+        <p:cNvGrpSpPr/>
+        <p:nvPr/>
+      </p:nvGrpSpPr>
+      <p:grpSpPr>
+        <a:xfrm>
+          <a:off x="0" y="0"/>
+          <a:ext cx="0" cy="0"/>
+          <a:chOff x="0" y="0"/>
+          <a:chExt cx="0" cy="0"/>
+        </a:xfrm>
+      </p:grpSpPr>
+      <p:sp>
+        <p:nvSpPr>
+          <p:cNvPr id="2" name="Slide Image Placeholder 1"/>
+          <p:cNvSpPr>
+            <a:spLocks noGrp="1" noRot="1" noChangeAspect="1"/>
+          </p:cNvSpPr>
+          <p:nvPr>
+            <p:ph type="sldImg"/>
+          </p:nvPr>
+        </p:nvSpPr>
+        <p:spPr/>
+      </p:sp>
+      <p:sp>
+        <p:nvSpPr>
+          <p:cNvPr id="3" name="Notes Placeholder 2"/>
+          <p:cNvSpPr>
+            <a:spLocks noGrp="1"/>
+          </p:cNvSpPr>
+          <p:nvPr>
+            <p:ph type="body" idx="1"/>
+          </p:nvPr>
+        </p:nvSpPr>
+        <p:spPr/>
+        <p:txBody>
+          <a:bodyPr/>
+          <a:lstStyle/>
+          <a:p>
+            <a:endParaRPr lang="en-GB" dirty="0"/>
+          </a:p>
+        </p:txBody>
+      </p:sp>
+      <p:sp>
+        <p:nvSpPr>
+          <p:cNvPr id="4" name="Slide Number Placeholder 3"/>
+          <p:cNvSpPr>
+            <a:spLocks noGrp="1"/>
+          </p:cNvSpPr>
+          <p:nvPr>
+            <p:ph type="sldNum" sz="quarter" idx="5"/>
+          </p:nvPr>
+        </p:nvSpPr>
+        <p:spPr/>
+        <p:txBody>
+          <a:bodyPr/>
+          <a:lstStyle/>
+          <a:p>
+            <a:fld id="{FAD751AE-7ABC-314D-AFAD-47B860ED6FFE}" type="slidenum">
+              <a:rPr lang="en-US" smtClean="0"/>
+              <a:pPr/>
+              <a:t>15</a:t>
+            </a:fld>
+            <a:endParaRPr lang="en-US"/>
+          </a:p>
+        </p:txBody>
+      </p:sp>
+    </p:spTree>
+    <p:extLst>
+      <p:ext uri="{BB962C8B-B14F-4D97-AF65-F5344CB8AC3E}">
+        <p14:creationId xmlns:p14="http://schemas.microsoft.com/office/powerpoint/2010/main" val="1492911542"/>
+      </p:ext>
+    </p:extLst>
+  </p:cSld>
+  <p:clrMapOvr>
+    <a:masterClrMapping/>
+  </p:clrMapOvr>
+</p:notes>
+</file>
+
 <file path=ppt/notesSlides/notesSlide2.xml><?xml version="1.0" encoding="utf-8"?>
 <p:notes xmlns:a="http://schemas.openxmlformats.org/drawingml/2006/main" xmlns:r="http://schemas.openxmlformats.org/officeDocument/2006/relationships" xmlns:p="http://schemas.openxmlformats.org/presentationml/2006/main">
   <p:cSld>
@@ -30445,6 +30531,183 @@
     <p:extLst>
       <p:ext uri="{BB962C8B-B14F-4D97-AF65-F5344CB8AC3E}">
         <p14:creationId xmlns:p14="http://schemas.microsoft.com/office/powerpoint/2010/main" val="3469896898"/>
+      </p:ext>
+    </p:extLst>
+  </p:cSld>
+  <p:clrMapOvr>
+    <a:masterClrMapping/>
+  </p:clrMapOvr>
+</p:sld>
+</file>
+
+<file path=ppt/slides/slide15.xml><?xml version="1.0" encoding="utf-8"?>
+<p:sld xmlns:a="http://schemas.openxmlformats.org/drawingml/2006/main" xmlns:r="http://schemas.openxmlformats.org/officeDocument/2006/relationships" xmlns:p="http://schemas.openxmlformats.org/presentationml/2006/main">
+  <p:cSld>
+    <p:spTree>
+      <p:nvGrpSpPr>
+        <p:cNvPr id="1" name=""/>
+        <p:cNvGrpSpPr/>
+        <p:nvPr/>
+      </p:nvGrpSpPr>
+      <p:grpSpPr>
+        <a:xfrm>
+          <a:off x="0" y="0"/>
+          <a:ext cx="0" cy="0"/>
+          <a:chOff x="0" y="0"/>
+          <a:chExt cx="0" cy="0"/>
+        </a:xfrm>
+      </p:grpSpPr>
+      <p:sp>
+        <p:nvSpPr>
+          <p:cNvPr id="2" name="Title 1">
+            <a:extLst>
+              <a:ext uri="{FF2B5EF4-FFF2-40B4-BE49-F238E27FC236}">
+                <a16:creationId xmlns:a16="http://schemas.microsoft.com/office/drawing/2014/main" id="{F7DA9A4F-1DFD-49DB-8569-F5AB18BD6161}"/>
+              </a:ext>
+            </a:extLst>
+          </p:cNvPr>
+          <p:cNvSpPr>
+            <a:spLocks noGrp="1"/>
+          </p:cNvSpPr>
+          <p:nvPr>
+            <p:ph type="title"/>
+          </p:nvPr>
+        </p:nvSpPr>
+        <p:spPr/>
+        <p:txBody>
+          <a:bodyPr/>
+          <a:lstStyle/>
+          <a:p>
+            <a:r>
+              <a:rPr lang="en-GB" dirty="0"/>
+              <a:t>Tangent: APIs and JSON</a:t>
+            </a:r>
+          </a:p>
+        </p:txBody>
+      </p:sp>
+      <p:sp>
+        <p:nvSpPr>
+          <p:cNvPr id="3" name="Slide Number Placeholder 2">
+            <a:extLst>
+              <a:ext uri="{FF2B5EF4-FFF2-40B4-BE49-F238E27FC236}">
+                <a16:creationId xmlns:a16="http://schemas.microsoft.com/office/drawing/2014/main" id="{7C3E703A-A386-472F-AD27-D2D983CC7A66}"/>
+              </a:ext>
+            </a:extLst>
+          </p:cNvPr>
+          <p:cNvSpPr>
+            <a:spLocks noGrp="1"/>
+          </p:cNvSpPr>
+          <p:nvPr>
+            <p:ph type="sldNum" sz="quarter" idx="4"/>
+          </p:nvPr>
+        </p:nvSpPr>
+        <p:spPr/>
+        <p:txBody>
+          <a:bodyPr/>
+          <a:lstStyle/>
+          <a:p>
+            <a:fld id="{3C4F54F3-C349-4609-AFEE-01462D5C7942}" type="slidenum">
+              <a:rPr lang="en-GB" smtClean="0"/>
+              <a:pPr/>
+              <a:t>15</a:t>
+            </a:fld>
+            <a:endParaRPr lang="en-GB"/>
+          </a:p>
+        </p:txBody>
+      </p:sp>
+      <p:pic>
+        <p:nvPicPr>
+          <p:cNvPr id="11" name="Picture 10">
+            <a:extLst>
+              <a:ext uri="{FF2B5EF4-FFF2-40B4-BE49-F238E27FC236}">
+                <a16:creationId xmlns:a16="http://schemas.microsoft.com/office/drawing/2014/main" id="{AE10D547-F5D1-43D9-93EA-E166E3C73F57}"/>
+              </a:ext>
+            </a:extLst>
+          </p:cNvPr>
+          <p:cNvPicPr>
+            <a:picLocks noChangeAspect="1"/>
+          </p:cNvPicPr>
+          <p:nvPr/>
+        </p:nvPicPr>
+        <p:blipFill rotWithShape="1">
+          <a:blip r:embed="rId3"/>
+          <a:srcRect l="2982" t="3174" r="2869" b="2900"/>
+          <a:stretch/>
+        </p:blipFill>
+        <p:spPr>
+          <a:xfrm>
+            <a:off x="8576572" y="4598283"/>
+            <a:ext cx="498106" cy="496941"/>
+          </a:xfrm>
+          <a:prstGeom prst="ellipse">
+            <a:avLst/>
+          </a:prstGeom>
+        </p:spPr>
+      </p:pic>
+      <p:pic>
+        <p:nvPicPr>
+          <p:cNvPr id="4" name="Picture 3">
+            <a:extLst>
+              <a:ext uri="{FF2B5EF4-FFF2-40B4-BE49-F238E27FC236}">
+                <a16:creationId xmlns:a16="http://schemas.microsoft.com/office/drawing/2014/main" id="{FA6CBD08-E586-4797-BAE3-DB7EDD9A371F}"/>
+              </a:ext>
+            </a:extLst>
+          </p:cNvPr>
+          <p:cNvPicPr>
+            <a:picLocks noChangeAspect="1"/>
+          </p:cNvPicPr>
+          <p:nvPr/>
+        </p:nvPicPr>
+        <p:blipFill>
+          <a:blip r:embed="rId4"/>
+          <a:stretch>
+            <a:fillRect/>
+          </a:stretch>
+        </p:blipFill>
+        <p:spPr>
+          <a:xfrm>
+            <a:off x="2332994" y="824331"/>
+            <a:ext cx="4478012" cy="2168699"/>
+          </a:xfrm>
+          <a:prstGeom prst="rect">
+            <a:avLst/>
+          </a:prstGeom>
+        </p:spPr>
+      </p:pic>
+      <p:pic>
+        <p:nvPicPr>
+          <p:cNvPr id="6" name="Picture 5">
+            <a:extLst>
+              <a:ext uri="{FF2B5EF4-FFF2-40B4-BE49-F238E27FC236}">
+                <a16:creationId xmlns:a16="http://schemas.microsoft.com/office/drawing/2014/main" id="{89036E8B-AD85-4E61-B119-17A3024A3D07}"/>
+              </a:ext>
+            </a:extLst>
+          </p:cNvPr>
+          <p:cNvPicPr>
+            <a:picLocks noChangeAspect="1"/>
+          </p:cNvPicPr>
+          <p:nvPr/>
+        </p:nvPicPr>
+        <p:blipFill>
+          <a:blip r:embed="rId5"/>
+          <a:stretch>
+            <a:fillRect/>
+          </a:stretch>
+        </p:blipFill>
+        <p:spPr>
+          <a:xfrm>
+            <a:off x="2048256" y="3234819"/>
+            <a:ext cx="5047488" cy="1560503"/>
+          </a:xfrm>
+          <a:prstGeom prst="rect">
+            <a:avLst/>
+          </a:prstGeom>
+        </p:spPr>
+      </p:pic>
+    </p:spTree>
+    <p:extLst>
+      <p:ext uri="{BB962C8B-B14F-4D97-AF65-F5344CB8AC3E}">
+        <p14:creationId xmlns:p14="http://schemas.microsoft.com/office/powerpoint/2010/main" val="2600252083"/>
       </p:ext>
     </p:extLst>
   </p:cSld>
@@ -36770,11 +37033,7 @@
 
 <file path=customXml/item1.xml><?xml version="1.0" encoding="utf-8"?>
 <?mso-contentType ?>
-<FormTemplates xmlns="http://schemas.microsoft.com/sharepoint/v3/contenttype/forms">
-  <Display>DocumentLibraryForm</Display>
-  <Edit>DocumentLibraryForm</Edit>
-  <New>DocumentLibraryForm</New>
-</FormTemplates>
+<SharedContentType xmlns="Microsoft.SharePoint.Taxonomy.ContentTypeSync" SourceId="1ee89e71-04cd-405e-9ca3-99e020c1694d" ContentTypeId="0x0101" PreviousValue="false"/>
 </file>
 
 <file path=customXml/item2.xml><?xml version="1.0" encoding="utf-8"?>
@@ -36958,7 +37217,11 @@
 
 <file path=customXml/item3.xml><?xml version="1.0" encoding="utf-8"?>
 <?mso-contentType ?>
-<SharedContentType xmlns="Microsoft.SharePoint.Taxonomy.ContentTypeSync" SourceId="1ee89e71-04cd-405e-9ca3-99e020c1694d" ContentTypeId="0x0101" PreviousValue="false"/>
+<FormTemplates xmlns="http://schemas.microsoft.com/sharepoint/v3/contenttype/forms">
+  <Display>DocumentLibraryForm</Display>
+  <Edit>DocumentLibraryForm</Edit>
+  <New>DocumentLibraryForm</New>
+</FormTemplates>
 </file>
 
 <file path=customXml/item4.xml><?xml version="1.0" encoding="utf-8"?>
@@ -36971,9 +37234,9 @@
 </file>
 
 <file path=customXml/itemProps1.xml><?xml version="1.0" encoding="utf-8"?>
-<ds:datastoreItem xmlns:ds="http://schemas.openxmlformats.org/officeDocument/2006/customXml" ds:itemID="{BEBDFA33-3959-412D-BF65-F572B77FF4EC}">
+<ds:datastoreItem xmlns:ds="http://schemas.openxmlformats.org/officeDocument/2006/customXml" ds:itemID="{91989A13-6EBC-4BFF-A25C-E4D3CAAA08AF}">
   <ds:schemaRefs>
-    <ds:schemaRef ds:uri="http://schemas.microsoft.com/sharepoint/v3/contenttype/forms"/>
+    <ds:schemaRef ds:uri="Microsoft.SharePoint.Taxonomy.ContentTypeSync"/>
   </ds:schemaRefs>
 </ds:datastoreItem>
 </file>
@@ -36998,9 +37261,9 @@
 </file>
 
 <file path=customXml/itemProps3.xml><?xml version="1.0" encoding="utf-8"?>
-<ds:datastoreItem xmlns:ds="http://schemas.openxmlformats.org/officeDocument/2006/customXml" ds:itemID="{91989A13-6EBC-4BFF-A25C-E4D3CAAA08AF}">
+<ds:datastoreItem xmlns:ds="http://schemas.openxmlformats.org/officeDocument/2006/customXml" ds:itemID="{BEBDFA33-3959-412D-BF65-F572B77FF4EC}">
   <ds:schemaRefs>
-    <ds:schemaRef ds:uri="Microsoft.SharePoint.Taxonomy.ContentTypeSync"/>
+    <ds:schemaRef ds:uri="http://schemas.microsoft.com/sharepoint/v3/contenttype/forms"/>
   </ds:schemaRefs>
 </ds:datastoreItem>
 </file>

</xml_diff>

<commit_message>
Remove AZ logo from background
</commit_message>
<xml_diff>
--- a/session_seven/session_seven_presentation.pptx
+++ b/session_seven/session_seven_presentation.pptx
@@ -28061,7 +28061,7 @@
 </file>
 
 <file path=ppt/slides/slide10.xml><?xml version="1.0" encoding="utf-8"?>
-<p:sld xmlns:a="http://schemas.openxmlformats.org/drawingml/2006/main" xmlns:r="http://schemas.openxmlformats.org/officeDocument/2006/relationships" xmlns:p="http://schemas.openxmlformats.org/presentationml/2006/main">
+<p:sld xmlns:a="http://schemas.openxmlformats.org/drawingml/2006/main" xmlns:r="http://schemas.openxmlformats.org/officeDocument/2006/relationships" xmlns:p="http://schemas.openxmlformats.org/presentationml/2006/main" showMasterSp="0">
   <p:cSld>
     <p:spTree>
       <p:nvGrpSpPr>
@@ -28505,7 +28505,7 @@
 </file>
 
 <file path=ppt/slides/slide11.xml><?xml version="1.0" encoding="utf-8"?>
-<p:sld xmlns:a="http://schemas.openxmlformats.org/drawingml/2006/main" xmlns:r="http://schemas.openxmlformats.org/officeDocument/2006/relationships" xmlns:p="http://schemas.openxmlformats.org/presentationml/2006/main">
+<p:sld xmlns:a="http://schemas.openxmlformats.org/drawingml/2006/main" xmlns:r="http://schemas.openxmlformats.org/officeDocument/2006/relationships" xmlns:p="http://schemas.openxmlformats.org/presentationml/2006/main" showMasterSp="0">
   <p:cSld>
     <p:spTree>
       <p:nvGrpSpPr>
@@ -28682,7 +28682,7 @@
 </file>
 
 <file path=ppt/slides/slide12.xml><?xml version="1.0" encoding="utf-8"?>
-<p:sld xmlns:a="http://schemas.openxmlformats.org/drawingml/2006/main" xmlns:r="http://schemas.openxmlformats.org/officeDocument/2006/relationships" xmlns:p="http://schemas.openxmlformats.org/presentationml/2006/main">
+<p:sld xmlns:a="http://schemas.openxmlformats.org/drawingml/2006/main" xmlns:r="http://schemas.openxmlformats.org/officeDocument/2006/relationships" xmlns:p="http://schemas.openxmlformats.org/presentationml/2006/main" showMasterSp="0">
   <p:cSld>
     <p:spTree>
       <p:nvGrpSpPr>
@@ -30032,7 +30032,7 @@
 </file>
 
 <file path=ppt/slides/slide13.xml><?xml version="1.0" encoding="utf-8"?>
-<p:sld xmlns:a="http://schemas.openxmlformats.org/drawingml/2006/main" xmlns:r="http://schemas.openxmlformats.org/officeDocument/2006/relationships" xmlns:p="http://schemas.openxmlformats.org/presentationml/2006/main">
+<p:sld xmlns:a="http://schemas.openxmlformats.org/drawingml/2006/main" xmlns:r="http://schemas.openxmlformats.org/officeDocument/2006/relationships" xmlns:p="http://schemas.openxmlformats.org/presentationml/2006/main" showMasterSp="0">
   <p:cSld>
     <p:spTree>
       <p:nvGrpSpPr>
@@ -30394,7 +30394,7 @@
 </file>
 
 <file path=ppt/slides/slide14.xml><?xml version="1.0" encoding="utf-8"?>
-<p:sld xmlns:a="http://schemas.openxmlformats.org/drawingml/2006/main" xmlns:r="http://schemas.openxmlformats.org/officeDocument/2006/relationships" xmlns:p="http://schemas.openxmlformats.org/presentationml/2006/main">
+<p:sld xmlns:a="http://schemas.openxmlformats.org/drawingml/2006/main" xmlns:r="http://schemas.openxmlformats.org/officeDocument/2006/relationships" xmlns:p="http://schemas.openxmlformats.org/presentationml/2006/main" showMasterSp="0">
   <p:cSld>
     <p:spTree>
       <p:nvGrpSpPr>
@@ -30541,7 +30541,7 @@
 </file>
 
 <file path=ppt/slides/slide15.xml><?xml version="1.0" encoding="utf-8"?>
-<p:sld xmlns:a="http://schemas.openxmlformats.org/drawingml/2006/main" xmlns:r="http://schemas.openxmlformats.org/officeDocument/2006/relationships" xmlns:p="http://schemas.openxmlformats.org/presentationml/2006/main">
+<p:sld xmlns:a="http://schemas.openxmlformats.org/drawingml/2006/main" xmlns:r="http://schemas.openxmlformats.org/officeDocument/2006/relationships" xmlns:p="http://schemas.openxmlformats.org/presentationml/2006/main" showMasterSp="0">
   <p:cSld>
     <p:spTree>
       <p:nvGrpSpPr>
@@ -31833,7 +31833,7 @@
 </file>
 
 <file path=ppt/slides/slide4.xml><?xml version="1.0" encoding="utf-8"?>
-<p:sld xmlns:a="http://schemas.openxmlformats.org/drawingml/2006/main" xmlns:r="http://schemas.openxmlformats.org/officeDocument/2006/relationships" xmlns:p="http://schemas.openxmlformats.org/presentationml/2006/main">
+<p:sld xmlns:a="http://schemas.openxmlformats.org/drawingml/2006/main" xmlns:r="http://schemas.openxmlformats.org/officeDocument/2006/relationships" xmlns:p="http://schemas.openxmlformats.org/presentationml/2006/main" showMasterSp="0">
   <p:cSld>
     <p:spTree>
       <p:nvGrpSpPr>
@@ -32253,7 +32253,7 @@
 </file>
 
 <file path=ppt/slides/slide5.xml><?xml version="1.0" encoding="utf-8"?>
-<p:sld xmlns:a="http://schemas.openxmlformats.org/drawingml/2006/main" xmlns:r="http://schemas.openxmlformats.org/officeDocument/2006/relationships" xmlns:p="http://schemas.openxmlformats.org/presentationml/2006/main">
+<p:sld xmlns:a="http://schemas.openxmlformats.org/drawingml/2006/main" xmlns:r="http://schemas.openxmlformats.org/officeDocument/2006/relationships" xmlns:p="http://schemas.openxmlformats.org/presentationml/2006/main" showMasterSp="0">
   <p:cSld>
     <p:spTree>
       <p:nvGrpSpPr>
@@ -32603,7 +32603,7 @@
 </file>
 
 <file path=ppt/slides/slide6.xml><?xml version="1.0" encoding="utf-8"?>
-<p:sld xmlns:a="http://schemas.openxmlformats.org/drawingml/2006/main" xmlns:r="http://schemas.openxmlformats.org/officeDocument/2006/relationships" xmlns:p="http://schemas.openxmlformats.org/presentationml/2006/main">
+<p:sld xmlns:a="http://schemas.openxmlformats.org/drawingml/2006/main" xmlns:r="http://schemas.openxmlformats.org/officeDocument/2006/relationships" xmlns:p="http://schemas.openxmlformats.org/presentationml/2006/main" showMasterSp="0">
   <p:cSld>
     <p:spTree>
       <p:nvGrpSpPr>
@@ -33185,7 +33185,7 @@
 </file>
 
 <file path=ppt/slides/slide7.xml><?xml version="1.0" encoding="utf-8"?>
-<p:sld xmlns:a="http://schemas.openxmlformats.org/drawingml/2006/main" xmlns:r="http://schemas.openxmlformats.org/officeDocument/2006/relationships" xmlns:p="http://schemas.openxmlformats.org/presentationml/2006/main">
+<p:sld xmlns:a="http://schemas.openxmlformats.org/drawingml/2006/main" xmlns:r="http://schemas.openxmlformats.org/officeDocument/2006/relationships" xmlns:p="http://schemas.openxmlformats.org/presentationml/2006/main" showMasterSp="0">
   <p:cSld>
     <p:spTree>
       <p:nvGrpSpPr>
@@ -33654,7 +33654,7 @@
 </file>
 
 <file path=ppt/slides/slide8.xml><?xml version="1.0" encoding="utf-8"?>
-<p:sld xmlns:a="http://schemas.openxmlformats.org/drawingml/2006/main" xmlns:r="http://schemas.openxmlformats.org/officeDocument/2006/relationships" xmlns:p="http://schemas.openxmlformats.org/presentationml/2006/main">
+<p:sld xmlns:a="http://schemas.openxmlformats.org/drawingml/2006/main" xmlns:r="http://schemas.openxmlformats.org/officeDocument/2006/relationships" xmlns:p="http://schemas.openxmlformats.org/presentationml/2006/main" showMasterSp="0">
   <p:cSld>
     <p:spTree>
       <p:nvGrpSpPr>
@@ -34064,7 +34064,7 @@
 </file>
 
 <file path=ppt/slides/slide9.xml><?xml version="1.0" encoding="utf-8"?>
-<p:sld xmlns:a="http://schemas.openxmlformats.org/drawingml/2006/main" xmlns:r="http://schemas.openxmlformats.org/officeDocument/2006/relationships" xmlns:p="http://schemas.openxmlformats.org/presentationml/2006/main">
+<p:sld xmlns:a="http://schemas.openxmlformats.org/drawingml/2006/main" xmlns:r="http://schemas.openxmlformats.org/officeDocument/2006/relationships" xmlns:p="http://schemas.openxmlformats.org/presentationml/2006/main" showMasterSp="0">
   <p:cSld>
     <p:spTree>
       <p:nvGrpSpPr>

</xml_diff>